<commit_message>
updated instructions for gaze, general,touch
</commit_message>
<xml_diff>
--- a/multibuild/v1.2/assets/ppt/gaze_sync.pptx
+++ b/multibuild/v1.2/assets/ppt/gaze_sync.pptx
@@ -7,9 +7,9 @@
   <p:sldIdLst>
     <p:sldId id="257" r:id="rId2"/>
     <p:sldId id="258" r:id="rId3"/>
-    <p:sldId id="259" r:id="rId4"/>
-    <p:sldId id="260" r:id="rId5"/>
-    <p:sldId id="261" r:id="rId6"/>
+    <p:sldId id="261" r:id="rId4"/>
+    <p:sldId id="259" r:id="rId5"/>
+    <p:sldId id="264" r:id="rId6"/>
     <p:sldId id="262" r:id="rId7"/>
   </p:sldIdLst>
   <p:sldSz cx="12192000" cy="6858000"/>
@@ -248,7 +248,7 @@
           <a:p>
             <a:fld id="{4A05E241-9B1A-4ED9-8724-5E03C726729F}" type="datetimeFigureOut">
               <a:rPr lang="he-IL" smtClean="0"/>
-              <a:t>ה'/כסלו/תשפ"ב</a:t>
+              <a:t>כ"ז/סיון/תשפ"ב</a:t>
             </a:fld>
             <a:endParaRPr lang="he-IL"/>
           </a:p>
@@ -418,7 +418,7 @@
           <a:p>
             <a:fld id="{4A05E241-9B1A-4ED9-8724-5E03C726729F}" type="datetimeFigureOut">
               <a:rPr lang="he-IL" smtClean="0"/>
-              <a:t>ה'/כסלו/תשפ"ב</a:t>
+              <a:t>כ"ז/סיון/תשפ"ב</a:t>
             </a:fld>
             <a:endParaRPr lang="he-IL"/>
           </a:p>
@@ -598,7 +598,7 @@
           <a:p>
             <a:fld id="{4A05E241-9B1A-4ED9-8724-5E03C726729F}" type="datetimeFigureOut">
               <a:rPr lang="he-IL" smtClean="0"/>
-              <a:t>ה'/כסלו/תשפ"ב</a:t>
+              <a:t>כ"ז/סיון/תשפ"ב</a:t>
             </a:fld>
             <a:endParaRPr lang="he-IL"/>
           </a:p>
@@ -768,7 +768,7 @@
           <a:p>
             <a:fld id="{4A05E241-9B1A-4ED9-8724-5E03C726729F}" type="datetimeFigureOut">
               <a:rPr lang="he-IL" smtClean="0"/>
-              <a:t>ה'/כסלו/תשפ"ב</a:t>
+              <a:t>כ"ז/סיון/תשפ"ב</a:t>
             </a:fld>
             <a:endParaRPr lang="he-IL"/>
           </a:p>
@@ -1014,7 +1014,7 @@
           <a:p>
             <a:fld id="{4A05E241-9B1A-4ED9-8724-5E03C726729F}" type="datetimeFigureOut">
               <a:rPr lang="he-IL" smtClean="0"/>
-              <a:t>ה'/כסלו/תשפ"ב</a:t>
+              <a:t>כ"ז/סיון/תשפ"ב</a:t>
             </a:fld>
             <a:endParaRPr lang="he-IL"/>
           </a:p>
@@ -1246,7 +1246,7 @@
           <a:p>
             <a:fld id="{4A05E241-9B1A-4ED9-8724-5E03C726729F}" type="datetimeFigureOut">
               <a:rPr lang="he-IL" smtClean="0"/>
-              <a:t>ה'/כסלו/תשפ"ב</a:t>
+              <a:t>כ"ז/סיון/תשפ"ב</a:t>
             </a:fld>
             <a:endParaRPr lang="he-IL"/>
           </a:p>
@@ -1613,7 +1613,7 @@
           <a:p>
             <a:fld id="{4A05E241-9B1A-4ED9-8724-5E03C726729F}" type="datetimeFigureOut">
               <a:rPr lang="he-IL" smtClean="0"/>
-              <a:t>ה'/כסלו/תשפ"ב</a:t>
+              <a:t>כ"ז/סיון/תשפ"ב</a:t>
             </a:fld>
             <a:endParaRPr lang="he-IL"/>
           </a:p>
@@ -1731,7 +1731,7 @@
           <a:p>
             <a:fld id="{4A05E241-9B1A-4ED9-8724-5E03C726729F}" type="datetimeFigureOut">
               <a:rPr lang="he-IL" smtClean="0"/>
-              <a:t>ה'/כסלו/תשפ"ב</a:t>
+              <a:t>כ"ז/סיון/תשפ"ב</a:t>
             </a:fld>
             <a:endParaRPr lang="he-IL"/>
           </a:p>
@@ -1826,7 +1826,7 @@
           <a:p>
             <a:fld id="{4A05E241-9B1A-4ED9-8724-5E03C726729F}" type="datetimeFigureOut">
               <a:rPr lang="he-IL" smtClean="0"/>
-              <a:t>ה'/כסלו/תשפ"ב</a:t>
+              <a:t>כ"ז/סיון/תשפ"ב</a:t>
             </a:fld>
             <a:endParaRPr lang="he-IL"/>
           </a:p>
@@ -2103,7 +2103,7 @@
           <a:p>
             <a:fld id="{4A05E241-9B1A-4ED9-8724-5E03C726729F}" type="datetimeFigureOut">
               <a:rPr lang="he-IL" smtClean="0"/>
-              <a:t>ה'/כסלו/תשפ"ב</a:t>
+              <a:t>כ"ז/סיון/תשפ"ב</a:t>
             </a:fld>
             <a:endParaRPr lang="he-IL"/>
           </a:p>
@@ -2360,7 +2360,7 @@
           <a:p>
             <a:fld id="{4A05E241-9B1A-4ED9-8724-5E03C726729F}" type="datetimeFigureOut">
               <a:rPr lang="he-IL" smtClean="0"/>
-              <a:t>ה'/כסלו/תשפ"ב</a:t>
+              <a:t>כ"ז/סיון/תשפ"ב</a:t>
             </a:fld>
             <a:endParaRPr lang="he-IL"/>
           </a:p>
@@ -2573,7 +2573,7 @@
           <a:p>
             <a:fld id="{4A05E241-9B1A-4ED9-8724-5E03C726729F}" type="datetimeFigureOut">
               <a:rPr lang="he-IL" smtClean="0"/>
-              <a:t>ה'/כסלו/תשפ"ב</a:t>
+              <a:t>כ"ז/סיון/תשפ"ב</a:t>
             </a:fld>
             <a:endParaRPr lang="he-IL"/>
           </a:p>
@@ -3018,7 +3018,7 @@
         <p:spPr/>
         <p:txBody>
           <a:bodyPr>
-            <a:normAutofit/>
+            <a:normAutofit fontScale="92500" lnSpcReduction="10000"/>
           </a:bodyPr>
           <a:lstStyle/>
           <a:p>
@@ -3027,7 +3027,42 @@
             </a:pPr>
             <a:r>
               <a:rPr lang="he-IL" dirty="0"/>
-              <a:t>אתם עומדים לצפות בקטע וידאו קצר המתאר אינטראקציה חברתית. אנא דרגו בעזרת הסליידר את רמת </a:t>
+              <a:t>אתם עומדים לצפות בקטע וידאו קצר המתאר אינטראקציה חברתית. </a:t>
+            </a:r>
+            <a:endParaRPr lang="he-IL" dirty="0" smtClean="0"/>
+          </a:p>
+          <a:p>
+            <a:pPr marL="0" indent="0">
+              <a:buNone/>
+            </a:pPr>
+            <a:endParaRPr lang="he-IL" dirty="0"/>
+          </a:p>
+          <a:p>
+            <a:pPr marL="0" indent="0">
+              <a:buNone/>
+            </a:pPr>
+            <a:r>
+              <a:rPr lang="he-IL" dirty="0" smtClean="0"/>
+              <a:t>מבט העיניים הוא מרכיב חשוב באינטראקציות חברתיות.</a:t>
+            </a:r>
+          </a:p>
+          <a:p>
+            <a:pPr marL="0" indent="0">
+              <a:buNone/>
+            </a:pPr>
+            <a:endParaRPr lang="he-IL" dirty="0" smtClean="0"/>
+          </a:p>
+          <a:p>
+            <a:pPr marL="0" indent="0">
+              <a:buNone/>
+            </a:pPr>
+            <a:r>
+              <a:rPr lang="he-IL" dirty="0" smtClean="0"/>
+              <a:t>אנא </a:t>
+            </a:r>
+            <a:r>
+              <a:rPr lang="he-IL" dirty="0"/>
+              <a:t>דרגו בעזרת הסליידר את רמת </a:t>
             </a:r>
             <a:r>
               <a:rPr lang="he-IL" dirty="0" smtClean="0"/>
@@ -3065,60 +3100,12 @@
             <a:endParaRPr lang="he-IL" dirty="0"/>
           </a:p>
           <a:p>
-            <a:pPr marL="0" indent="0">
+            <a:pPr marL="0" indent="0" algn="ctr">
               <a:buNone/>
             </a:pPr>
             <a:r>
               <a:rPr lang="he-IL" dirty="0" smtClean="0"/>
-              <a:t>נציג לכם מספר רמות של סינכרון: </a:t>
-            </a:r>
-            <a:r>
-              <a:rPr lang="he-IL" dirty="0" smtClean="0">
-                <a:solidFill>
-                  <a:srgbClr val="92D050"/>
-                </a:solidFill>
-              </a:rPr>
-              <a:t>גבוהה</a:t>
-            </a:r>
-            <a:r>
-              <a:rPr lang="he-IL" dirty="0" smtClean="0"/>
-              <a:t>, </a:t>
-            </a:r>
-            <a:r>
-              <a:rPr lang="he-IL" dirty="0" smtClean="0">
-                <a:solidFill>
-                  <a:srgbClr val="FFFF00"/>
-                </a:solidFill>
-              </a:rPr>
-              <a:t>בינונית</a:t>
-            </a:r>
-            <a:r>
-              <a:rPr lang="he-IL" dirty="0" smtClean="0"/>
-              <a:t>, </a:t>
-            </a:r>
-            <a:r>
-              <a:rPr lang="he-IL" dirty="0" smtClean="0">
-                <a:solidFill>
-                  <a:srgbClr val="FFC000"/>
-                </a:solidFill>
-              </a:rPr>
-              <a:t>נמוכה</a:t>
-            </a:r>
-            <a:r>
-              <a:rPr lang="he-IL" dirty="0" smtClean="0"/>
-              <a:t> </a:t>
-            </a:r>
-            <a:r>
-              <a:rPr lang="he-IL" dirty="0" smtClean="0">
-                <a:solidFill>
-                  <a:srgbClr val="FF0000"/>
-                </a:solidFill>
-              </a:rPr>
-              <a:t>וללא סינכרון כלל</a:t>
-            </a:r>
-            <a:r>
-              <a:rPr lang="he-IL" dirty="0" smtClean="0"/>
-              <a:t>. </a:t>
+              <a:t>מיד נציג לכם מספר דוגמאות:</a:t>
             </a:r>
             <a:endParaRPr lang="he-IL" dirty="0"/>
           </a:p>
@@ -3147,6 +3134,13 @@
   <p:clrMapOvr>
     <a:masterClrMapping/>
   </p:clrMapOvr>
+  <p:timing>
+    <p:tnLst>
+      <p:par>
+        <p:cTn id="1" dur="indefinite" restart="never" nodeType="tmRoot"/>
+      </p:par>
+    </p:tnLst>
+  </p:timing>
 </p:sld>
 </file>
 
@@ -3167,75 +3161,6 @@
           <a:chExt cx="0" cy="0"/>
         </a:xfrm>
       </p:grpSpPr>
-      <p:sp>
-        <p:nvSpPr>
-          <p:cNvPr id="2" name="Title 1"/>
-          <p:cNvSpPr>
-            <a:spLocks noGrp="1"/>
-          </p:cNvSpPr>
-          <p:nvPr>
-            <p:ph type="title"/>
-          </p:nvPr>
-        </p:nvSpPr>
-        <p:spPr/>
-        <p:txBody>
-          <a:bodyPr/>
-          <a:lstStyle/>
-          <a:p>
-            <a:endParaRPr lang="he-IL"/>
-          </a:p>
-        </p:txBody>
-      </p:sp>
-      <p:sp>
-        <p:nvSpPr>
-          <p:cNvPr id="3" name="Content Placeholder 2"/>
-          <p:cNvSpPr>
-            <a:spLocks noGrp="1"/>
-          </p:cNvSpPr>
-          <p:nvPr>
-            <p:ph idx="1"/>
-          </p:nvPr>
-        </p:nvSpPr>
-        <p:spPr>
-          <a:xfrm>
-            <a:off x="759823" y="1930127"/>
-            <a:ext cx="10515600" cy="4351338"/>
-          </a:xfrm>
-        </p:spPr>
-        <p:txBody>
-          <a:bodyPr/>
-          <a:lstStyle/>
-          <a:p>
-            <a:pPr marL="0" indent="0">
-              <a:buNone/>
-            </a:pPr>
-            <a:r>
-              <a:rPr lang="he-IL" dirty="0" smtClean="0"/>
-              <a:t>רמת סינכרון </a:t>
-            </a:r>
-            <a:r>
-              <a:rPr lang="he-IL" dirty="0"/>
-              <a:t>מבט </a:t>
-            </a:r>
-            <a:r>
-              <a:rPr lang="he-IL" dirty="0" smtClean="0">
-                <a:solidFill>
-                  <a:srgbClr val="92D050"/>
-                </a:solidFill>
-              </a:rPr>
-              <a:t>גבוהה</a:t>
-            </a:r>
-            <a:r>
-              <a:rPr lang="he-IL" dirty="0" smtClean="0"/>
-              <a:t> </a:t>
-            </a:r>
-            <a:r>
-              <a:rPr lang="he-IL" dirty="0"/>
-              <a:t>הוא קשר עין ישיר בין הדמויות (למשל דמות א' מביטה ישירות בדמות ב', אשר גם מביטה ישירות בדמות א')</a:t>
-            </a:r>
-          </a:p>
-        </p:txBody>
-      </p:sp>
       <p:pic>
         <p:nvPicPr>
           <p:cNvPr id="4" name="Picture 3"/>
@@ -3251,8 +3176,8 @@
           </a:stretch>
         </p:blipFill>
         <p:spPr>
-          <a:xfrm>
-            <a:off x="3400441" y="5065757"/>
+          <a:xfrm rot="10800000">
+            <a:off x="3241638" y="5004797"/>
             <a:ext cx="5551970" cy="1667786"/>
           </a:xfrm>
           <a:prstGeom prst="rect">
@@ -3260,6 +3185,52 @@
           </a:prstGeom>
         </p:spPr>
       </p:pic>
+      <p:sp>
+        <p:nvSpPr>
+          <p:cNvPr id="3" name="Content Placeholder 2"/>
+          <p:cNvSpPr>
+            <a:spLocks noGrp="1"/>
+          </p:cNvSpPr>
+          <p:nvPr>
+            <p:ph idx="1"/>
+          </p:nvPr>
+        </p:nvSpPr>
+        <p:spPr>
+          <a:xfrm>
+            <a:off x="492627" y="508753"/>
+            <a:ext cx="10515600" cy="4351338"/>
+          </a:xfrm>
+        </p:spPr>
+        <p:txBody>
+          <a:bodyPr/>
+          <a:lstStyle/>
+          <a:p>
+            <a:pPr marL="0" indent="0">
+              <a:buNone/>
+            </a:pPr>
+            <a:r>
+              <a:rPr lang="he-IL" dirty="0" smtClean="0"/>
+              <a:t>רמת סינכרון </a:t>
+            </a:r>
+            <a:r>
+              <a:rPr lang="he-IL" dirty="0"/>
+              <a:t>מבט </a:t>
+            </a:r>
+            <a:r>
+              <a:rPr lang="he-IL" b="1" dirty="0" smtClean="0"/>
+              <a:t>גבוהה</a:t>
+            </a:r>
+            <a:r>
+              <a:rPr lang="he-IL" dirty="0" smtClean="0"/>
+              <a:t> יכולה להיות </a:t>
+            </a:r>
+            <a:r>
+              <a:rPr lang="he-IL" dirty="0"/>
+              <a:t>קשר עין ישיר בין הדמויות (למשל דמות א' מביטה ישירות בדמות ב', אשר גם מביטה ישירות בדמות א')</a:t>
+            </a:r>
+          </a:p>
+        </p:txBody>
+      </p:sp>
       <p:pic>
         <p:nvPicPr>
           <p:cNvPr id="5122" name="Picture 2" descr="https://lh5.googleusercontent.com/Vm6Y3EQ3BWlC0JpnGnP2GWYmFvlONSvKbzWx2a-TiqlH8ws-xDDbp8Bf9hv47LNuqug1P5yKr-T5wFZY3Aqj0aQ2ES1y9sv4JlmnAAddHWUgYe3rsQzdHO-cegjvCzGqLWnKZwHX"/>
@@ -3283,8 +3254,8 @@
         </p:blipFill>
         <p:spPr bwMode="auto">
           <a:xfrm>
-            <a:off x="2653002" y="3234248"/>
-            <a:ext cx="2225523" cy="1893355"/>
+            <a:off x="1542823" y="2219498"/>
+            <a:ext cx="3418300" cy="2979519"/>
           </a:xfrm>
           <a:prstGeom prst="rect">
             <a:avLst/>
@@ -3324,8 +3295,8 @@
         </p:blipFill>
         <p:spPr bwMode="auto">
           <a:xfrm>
-            <a:off x="6713856" y="3296093"/>
-            <a:ext cx="2931528" cy="1902924"/>
+            <a:off x="6306533" y="2219498"/>
+            <a:ext cx="4590064" cy="2979519"/>
           </a:xfrm>
           <a:prstGeom prst="rect">
             <a:avLst/>
@@ -3342,6 +3313,30 @@
           </a:extLst>
         </p:spPr>
       </p:pic>
+      <p:pic>
+        <p:nvPicPr>
+          <p:cNvPr id="7" name="Picture 6"/>
+          <p:cNvPicPr>
+            <a:picLocks noChangeAspect="1"/>
+          </p:cNvPicPr>
+          <p:nvPr/>
+        </p:nvPicPr>
+        <p:blipFill>
+          <a:blip r:embed="rId5"/>
+          <a:stretch>
+            <a:fillRect/>
+          </a:stretch>
+        </p:blipFill>
+        <p:spPr>
+          <a:xfrm rot="10800000">
+            <a:off x="2867042" y="5294210"/>
+            <a:ext cx="5883150" cy="1303133"/>
+          </a:xfrm>
+          <a:prstGeom prst="rect">
+            <a:avLst/>
+          </a:prstGeom>
+        </p:spPr>
+      </p:pic>
     </p:spTree>
     <p:extLst>
       <p:ext uri="{BB962C8B-B14F-4D97-AF65-F5344CB8AC3E}">
@@ -3352,6 +3347,13 @@
   <p:clrMapOvr>
     <a:masterClrMapping/>
   </p:clrMapOvr>
+  <p:timing>
+    <p:tnLst>
+      <p:par>
+        <p:cTn id="1" dur="indefinite" restart="never" nodeType="tmRoot"/>
+      </p:par>
+    </p:tnLst>
+  </p:timing>
 </p:sld>
 </file>
 
@@ -3384,8 +3386,8 @@
         </p:nvSpPr>
         <p:spPr>
           <a:xfrm>
-            <a:off x="698863" y="868246"/>
-            <a:ext cx="10515600" cy="4351338"/>
+            <a:off x="261059" y="512142"/>
+            <a:ext cx="11243755" cy="4351338"/>
           </a:xfrm>
         </p:spPr>
         <p:txBody>
@@ -3396,34 +3398,25 @@
               <a:buNone/>
             </a:pPr>
             <a:r>
+              <a:rPr lang="he-IL" dirty="0" smtClean="0"/>
+              <a:t>לעומת זאת, כאשר </a:t>
+            </a:r>
+            <a:r>
               <a:rPr lang="he-IL" dirty="0"/>
-              <a:t>בשלב הבא, סינכרון </a:t>
+              <a:t>על המסך מופיעה דמות אחת בלבד או כאשר שתי הדמויות </a:t>
             </a:r>
             <a:r>
               <a:rPr lang="he-IL" dirty="0" smtClean="0"/>
-              <a:t>מבט קיים גם כאשר </a:t>
+              <a:t>אינן מתואמות במבטיהן ואינן מסתכלות על אותו דבר, </a:t>
+            </a:r>
+            <a:r>
+              <a:rPr lang="he-IL" b="1" dirty="0"/>
+              <a:t>אין כלל סינכרון מבט</a:t>
             </a:r>
             <a:r>
               <a:rPr lang="he-IL" dirty="0"/>
-              <a:t>שתי הדמויות מביטות באותו אובייקט בו </a:t>
-            </a:r>
-            <a:r>
-              <a:rPr lang="he-IL" dirty="0" smtClean="0"/>
-              <a:t>זמנית. זהו מצב שבו יש רמת סינכרון מבט </a:t>
-            </a:r>
-            <a:r>
-              <a:rPr lang="he-IL" dirty="0" smtClean="0">
-                <a:solidFill>
-                  <a:srgbClr val="FFFF00"/>
-                </a:solidFill>
-              </a:rPr>
-              <a:t>בינונית</a:t>
-            </a:r>
-            <a:r>
-              <a:rPr lang="he-IL" dirty="0" smtClean="0"/>
-              <a:t> בין הדמויות: פחות מאשר במקרים שהן מביטות זו בזו אך יותר מאשר מקרים שבהם הן מביטות לדברים שונים או לגמרי מנותקות זו מזו.</a:t>
-            </a:r>
-            <a:endParaRPr lang="he-IL" dirty="0"/>
+              <a:t>.</a:t>
+            </a:r>
           </a:p>
           <a:p>
             <a:pPr marL="0" indent="0">
@@ -3442,14 +3435,14 @@
       </p:sp>
       <p:pic>
         <p:nvPicPr>
-          <p:cNvPr id="6146" name="Picture 2" descr="https://lh3.googleusercontent.com/t7Z5FV4mtgrGb80MM2CGdc57Iz6QWB1zSoZii00TqiDVugnaLpLJc2wQ_MhsQh_LlLJrOdoRIY_H0Xs4snAgBIATvmNT50ipkpStZvIX1VvvwVhmXljTpLRvFAh-_jOkt3okXZtg"/>
+          <p:cNvPr id="8194" name="Picture 2" descr="https://lh6.googleusercontent.com/Z26laRp8NfxxbBuKiM4Q3Ub3WL2d7DfO-rW5EsU3BpilCv3U6-L6NxOOwwuTMRvH8WmxcwCnxxwlKtTEb41syKxD3qhnEz3EoXpBLSwVKNB48VCckH5P5qDRa-KXhs85xAQb0Trz"/>
           <p:cNvPicPr>
             <a:picLocks noChangeAspect="1" noChangeArrowheads="1"/>
           </p:cNvPicPr>
           <p:nvPr/>
         </p:nvPicPr>
         <p:blipFill>
-          <a:blip r:embed="rId2">
+          <a:blip r:embed="rId2" cstate="print">
             <a:extLst>
               <a:ext uri="{28A0092B-C50C-407E-A947-70E740481C1C}">
                 <a14:useLocalDpi xmlns:a14="http://schemas.microsoft.com/office/drawing/2010/main" val="0"/>
@@ -3463,406 +3456,8 @@
         </p:blipFill>
         <p:spPr bwMode="auto">
           <a:xfrm>
-            <a:off x="4097155" y="2816516"/>
-            <a:ext cx="3997688" cy="2658361"/>
-          </a:xfrm>
-          <a:prstGeom prst="rect">
-            <a:avLst/>
-          </a:prstGeom>
-          <a:noFill/>
-          <a:extLst>
-            <a:ext uri="{909E8E84-426E-40DD-AFC4-6F175D3DCCD1}">
-              <a14:hiddenFill xmlns:a14="http://schemas.microsoft.com/office/drawing/2010/main">
-                <a:solidFill>
-                  <a:srgbClr val="FFFFFF"/>
-                </a:solidFill>
-              </a14:hiddenFill>
-            </a:ext>
-          </a:extLst>
-        </p:spPr>
-      </p:pic>
-      <p:pic>
-        <p:nvPicPr>
-          <p:cNvPr id="8" name="Picture 7"/>
-          <p:cNvPicPr>
-            <a:picLocks noChangeAspect="1"/>
-          </p:cNvPicPr>
-          <p:nvPr/>
-        </p:nvPicPr>
-        <p:blipFill>
-          <a:blip r:embed="rId3"/>
-          <a:stretch>
-            <a:fillRect/>
-          </a:stretch>
-        </p:blipFill>
-        <p:spPr>
-          <a:xfrm rot="10800000">
-            <a:off x="3226821" y="5524384"/>
-            <a:ext cx="5738357" cy="1333616"/>
-          </a:xfrm>
-          <a:prstGeom prst="rect">
-            <a:avLst/>
-          </a:prstGeom>
-        </p:spPr>
-      </p:pic>
-    </p:spTree>
-    <p:extLst>
-      <p:ext uri="{BB962C8B-B14F-4D97-AF65-F5344CB8AC3E}">
-        <p14:creationId xmlns:p14="http://schemas.microsoft.com/office/powerpoint/2010/main" val="3150151110"/>
-      </p:ext>
-    </p:extLst>
-  </p:cSld>
-  <p:clrMapOvr>
-    <a:masterClrMapping/>
-  </p:clrMapOvr>
-</p:sld>
-</file>
-
-<file path=ppt/slides/slide4.xml><?xml version="1.0" encoding="utf-8"?>
-<p:sld xmlns:a="http://schemas.openxmlformats.org/drawingml/2006/main" xmlns:r="http://schemas.openxmlformats.org/officeDocument/2006/relationships" xmlns:p="http://schemas.openxmlformats.org/presentationml/2006/main">
-  <p:cSld>
-    <p:spTree>
-      <p:nvGrpSpPr>
-        <p:cNvPr id="1" name=""/>
-        <p:cNvGrpSpPr/>
-        <p:nvPr/>
-      </p:nvGrpSpPr>
-      <p:grpSpPr>
-        <a:xfrm>
-          <a:off x="0" y="0"/>
-          <a:ext cx="0" cy="0"/>
-          <a:chOff x="0" y="0"/>
-          <a:chExt cx="0" cy="0"/>
-        </a:xfrm>
-      </p:grpSpPr>
-      <p:sp>
-        <p:nvSpPr>
-          <p:cNvPr id="2" name="Title 1"/>
-          <p:cNvSpPr>
-            <a:spLocks noGrp="1"/>
-          </p:cNvSpPr>
-          <p:nvPr>
-            <p:ph type="title"/>
-          </p:nvPr>
-        </p:nvSpPr>
-        <p:spPr/>
-        <p:txBody>
-          <a:bodyPr/>
-          <a:lstStyle/>
-          <a:p>
-            <a:endParaRPr lang="he-IL"/>
-          </a:p>
-        </p:txBody>
-      </p:sp>
-      <p:sp>
-        <p:nvSpPr>
-          <p:cNvPr id="3" name="Content Placeholder 2"/>
-          <p:cNvSpPr>
-            <a:spLocks noGrp="1"/>
-          </p:cNvSpPr>
-          <p:nvPr>
-            <p:ph idx="1"/>
-          </p:nvPr>
-        </p:nvSpPr>
-        <p:spPr>
-          <a:xfrm>
-            <a:off x="838200" y="1690688"/>
-            <a:ext cx="10515600" cy="4351338"/>
-          </a:xfrm>
-        </p:spPr>
-        <p:txBody>
-          <a:bodyPr/>
-          <a:lstStyle/>
-          <a:p>
-            <a:pPr marL="0" indent="0">
-              <a:buNone/>
-            </a:pPr>
-            <a:r>
-              <a:rPr lang="he-IL" dirty="0"/>
-              <a:t>רמה </a:t>
-            </a:r>
-            <a:r>
-              <a:rPr lang="he-IL" dirty="0">
-                <a:solidFill>
-                  <a:srgbClr val="FFC000"/>
-                </a:solidFill>
-              </a:rPr>
-              <a:t>נמוכה</a:t>
-            </a:r>
-            <a:r>
-              <a:rPr lang="he-IL" dirty="0"/>
-              <a:t> של </a:t>
-            </a:r>
-            <a:r>
-              <a:rPr lang="he-IL" dirty="0" smtClean="0"/>
-              <a:t>סינכרון </a:t>
-            </a:r>
-            <a:r>
-              <a:rPr lang="he-IL" dirty="0"/>
-              <a:t>מבט היא כאשר דמות א' מביטה בדמות ב' ודמות ב' מסיטה את מבטה ונמנעת מיצירת קשר עין</a:t>
-            </a:r>
-          </a:p>
-        </p:txBody>
-      </p:sp>
-      <p:pic>
-        <p:nvPicPr>
-          <p:cNvPr id="7" name="Picture 6"/>
-          <p:cNvPicPr>
-            <a:picLocks noChangeAspect="1"/>
-          </p:cNvPicPr>
-          <p:nvPr/>
-        </p:nvPicPr>
-        <p:blipFill>
-          <a:blip r:embed="rId2"/>
-          <a:stretch>
-            <a:fillRect/>
-          </a:stretch>
-        </p:blipFill>
-        <p:spPr>
-          <a:xfrm>
-            <a:off x="3226821" y="5187288"/>
-            <a:ext cx="5738357" cy="1333616"/>
-          </a:xfrm>
-          <a:prstGeom prst="rect">
-            <a:avLst/>
-          </a:prstGeom>
-        </p:spPr>
-      </p:pic>
-      <p:pic>
-        <p:nvPicPr>
-          <p:cNvPr id="7170" name="Picture 2" descr="https://lh6.googleusercontent.com/qMBKLuBCkNnP77G2K59inZ-HyH-FakPfYNqSF9x_XbT6xN2-8qBIlnpRYGA8v2-QHneIDKLfi0fvT248nxrbC_hXi2a53ui_Pdh73t0WaMoiofZGPSF7aTI9jhP18E1q4owPvNt3"/>
-          <p:cNvPicPr>
-            <a:picLocks noChangeAspect="1" noChangeArrowheads="1"/>
-          </p:cNvPicPr>
-          <p:nvPr/>
-        </p:nvPicPr>
-        <p:blipFill>
-          <a:blip r:embed="rId3">
-            <a:extLst>
-              <a:ext uri="{28A0092B-C50C-407E-A947-70E740481C1C}">
-                <a14:useLocalDpi xmlns:a14="http://schemas.microsoft.com/office/drawing/2010/main" val="0"/>
-              </a:ext>
-            </a:extLst>
-          </a:blip>
-          <a:srcRect/>
-          <a:stretch>
-            <a:fillRect/>
-          </a:stretch>
-        </p:blipFill>
-        <p:spPr bwMode="auto">
-          <a:xfrm>
-            <a:off x="2019935" y="3386228"/>
-            <a:ext cx="2848156" cy="1622973"/>
-          </a:xfrm>
-          <a:prstGeom prst="rect">
-            <a:avLst/>
-          </a:prstGeom>
-          <a:noFill/>
-          <a:extLst>
-            <a:ext uri="{909E8E84-426E-40DD-AFC4-6F175D3DCCD1}">
-              <a14:hiddenFill xmlns:a14="http://schemas.microsoft.com/office/drawing/2010/main">
-                <a:solidFill>
-                  <a:srgbClr val="FFFFFF"/>
-                </a:solidFill>
-              </a14:hiddenFill>
-            </a:ext>
-          </a:extLst>
-        </p:spPr>
-      </p:pic>
-      <p:pic>
-        <p:nvPicPr>
-          <p:cNvPr id="7172" name="Picture 4" descr="https://lh3.googleusercontent.com/Dt44oYW67i7wkF0nsFLlUk4Lti7Ia8cpjq54sFZY0c5_pNWOCPcV4M0K5SSlfzp21Uy4Q5nWR_AzbR8mkCaBmHwyNW5Nzir7MFRnM0TcrJNgSwVs1hpLR-ji3riG2c3el-8UA-dT"/>
-          <p:cNvPicPr>
-            <a:picLocks noChangeAspect="1" noChangeArrowheads="1"/>
-          </p:cNvPicPr>
-          <p:nvPr/>
-        </p:nvPicPr>
-        <p:blipFill>
-          <a:blip r:embed="rId4">
-            <a:extLst>
-              <a:ext uri="{28A0092B-C50C-407E-A947-70E740481C1C}">
-                <a14:useLocalDpi xmlns:a14="http://schemas.microsoft.com/office/drawing/2010/main" val="0"/>
-              </a:ext>
-            </a:extLst>
-          </a:blip>
-          <a:srcRect/>
-          <a:stretch>
-            <a:fillRect/>
-          </a:stretch>
-        </p:blipFill>
-        <p:spPr bwMode="auto">
-          <a:xfrm>
-            <a:off x="6414879" y="3386228"/>
-            <a:ext cx="2720412" cy="1622973"/>
-          </a:xfrm>
-          <a:prstGeom prst="rect">
-            <a:avLst/>
-          </a:prstGeom>
-          <a:noFill/>
-          <a:extLst>
-            <a:ext uri="{909E8E84-426E-40DD-AFC4-6F175D3DCCD1}">
-              <a14:hiddenFill xmlns:a14="http://schemas.microsoft.com/office/drawing/2010/main">
-                <a:solidFill>
-                  <a:srgbClr val="FFFFFF"/>
-                </a:solidFill>
-              </a14:hiddenFill>
-            </a:ext>
-          </a:extLst>
-        </p:spPr>
-      </p:pic>
-    </p:spTree>
-    <p:extLst>
-      <p:ext uri="{BB962C8B-B14F-4D97-AF65-F5344CB8AC3E}">
-        <p14:creationId xmlns:p14="http://schemas.microsoft.com/office/powerpoint/2010/main" val="1336883419"/>
-      </p:ext>
-    </p:extLst>
-  </p:cSld>
-  <p:clrMapOvr>
-    <a:masterClrMapping/>
-  </p:clrMapOvr>
-</p:sld>
-</file>
-
-<file path=ppt/slides/slide5.xml><?xml version="1.0" encoding="utf-8"?>
-<p:sld xmlns:a="http://schemas.openxmlformats.org/drawingml/2006/main" xmlns:r="http://schemas.openxmlformats.org/officeDocument/2006/relationships" xmlns:p="http://schemas.openxmlformats.org/presentationml/2006/main">
-  <p:cSld>
-    <p:spTree>
-      <p:nvGrpSpPr>
-        <p:cNvPr id="1" name=""/>
-        <p:cNvGrpSpPr/>
-        <p:nvPr/>
-      </p:nvGrpSpPr>
-      <p:grpSpPr>
-        <a:xfrm>
-          <a:off x="0" y="0"/>
-          <a:ext cx="0" cy="0"/>
-          <a:chOff x="0" y="0"/>
-          <a:chExt cx="0" cy="0"/>
-        </a:xfrm>
-      </p:grpSpPr>
-      <p:sp>
-        <p:nvSpPr>
-          <p:cNvPr id="2" name="Title 1"/>
-          <p:cNvSpPr>
-            <a:spLocks noGrp="1"/>
-          </p:cNvSpPr>
-          <p:nvPr>
-            <p:ph type="title"/>
-          </p:nvPr>
-        </p:nvSpPr>
-        <p:spPr/>
-        <p:txBody>
-          <a:bodyPr/>
-          <a:lstStyle/>
-          <a:p>
-            <a:endParaRPr lang="he-IL"/>
-          </a:p>
-        </p:txBody>
-      </p:sp>
-      <p:sp>
-        <p:nvSpPr>
-          <p:cNvPr id="3" name="Content Placeholder 2"/>
-          <p:cNvSpPr>
-            <a:spLocks noGrp="1"/>
-          </p:cNvSpPr>
-          <p:nvPr>
-            <p:ph idx="1"/>
-          </p:nvPr>
-        </p:nvSpPr>
-        <p:spPr>
-          <a:xfrm>
-            <a:off x="814450" y="1690688"/>
-            <a:ext cx="10515600" cy="4351338"/>
-          </a:xfrm>
-        </p:spPr>
-        <p:txBody>
-          <a:bodyPr/>
-          <a:lstStyle/>
-          <a:p>
-            <a:pPr marL="0" indent="0">
-              <a:buNone/>
-            </a:pPr>
-            <a:r>
-              <a:rPr lang="he-IL" dirty="0"/>
-              <a:t>כאשר על המסך מופיעה דמות אחת בלבד או כאשר שתי הדמויות מסיטות מבט, </a:t>
-            </a:r>
-            <a:r>
-              <a:rPr lang="he-IL" dirty="0">
-                <a:solidFill>
-                  <a:srgbClr val="FF0000"/>
-                </a:solidFill>
-              </a:rPr>
-              <a:t>אין כלל סינכרון מבט</a:t>
-            </a:r>
-            <a:r>
-              <a:rPr lang="he-IL" dirty="0"/>
-              <a:t>.</a:t>
-            </a:r>
-          </a:p>
-          <a:p>
-            <a:pPr marL="0" indent="0">
-              <a:buNone/>
-            </a:pPr>
-            <a:r>
-              <a:rPr lang="he-IL" dirty="0"/>
-              <a:t/>
-            </a:r>
-            <a:br>
-              <a:rPr lang="he-IL" dirty="0"/>
-            </a:br>
-            <a:endParaRPr lang="he-IL" dirty="0"/>
-          </a:p>
-        </p:txBody>
-      </p:sp>
-      <p:pic>
-        <p:nvPicPr>
-          <p:cNvPr id="4" name="Picture 3"/>
-          <p:cNvPicPr>
-            <a:picLocks noChangeAspect="1"/>
-          </p:cNvPicPr>
-          <p:nvPr/>
-        </p:nvPicPr>
-        <p:blipFill>
-          <a:blip r:embed="rId2"/>
-          <a:stretch>
-            <a:fillRect/>
-          </a:stretch>
-        </p:blipFill>
-        <p:spPr>
-          <a:xfrm>
-            <a:off x="2867042" y="5294210"/>
-            <a:ext cx="5883150" cy="1303133"/>
-          </a:xfrm>
-          <a:prstGeom prst="rect">
-            <a:avLst/>
-          </a:prstGeom>
-        </p:spPr>
-      </p:pic>
-      <p:pic>
-        <p:nvPicPr>
-          <p:cNvPr id="8194" name="Picture 2" descr="https://lh6.googleusercontent.com/Z26laRp8NfxxbBuKiM4Q3Ub3WL2d7DfO-rW5EsU3BpilCv3U6-L6NxOOwwuTMRvH8WmxcwCnxxwlKtTEb41syKxD3qhnEz3EoXpBLSwVKNB48VCckH5P5qDRa-KXhs85xAQb0Trz"/>
-          <p:cNvPicPr>
-            <a:picLocks noChangeAspect="1" noChangeArrowheads="1"/>
-          </p:cNvPicPr>
-          <p:nvPr/>
-        </p:nvPicPr>
-        <p:blipFill>
-          <a:blip r:embed="rId3" cstate="print">
-            <a:extLst>
-              <a:ext uri="{28A0092B-C50C-407E-A947-70E740481C1C}">
-                <a14:useLocalDpi xmlns:a14="http://schemas.microsoft.com/office/drawing/2010/main" val="0"/>
-              </a:ext>
-            </a:extLst>
-          </a:blip>
-          <a:srcRect/>
-          <a:stretch>
-            <a:fillRect/>
-          </a:stretch>
-        </p:blipFill>
-        <p:spPr bwMode="auto">
-          <a:xfrm>
-            <a:off x="2867042" y="2998695"/>
-            <a:ext cx="1350282" cy="2367379"/>
+            <a:off x="2331275" y="1772485"/>
+            <a:ext cx="1869423" cy="3291843"/>
           </a:xfrm>
           <a:prstGeom prst="rect">
             <a:avLst/>
@@ -3888,7 +3483,7 @@
           <p:nvPr/>
         </p:nvPicPr>
         <p:blipFill>
-          <a:blip r:embed="rId4">
+          <a:blip r:embed="rId3">
             <a:extLst>
               <a:ext uri="{28A0092B-C50C-407E-A947-70E740481C1C}">
                 <a14:useLocalDpi xmlns:a14="http://schemas.microsoft.com/office/drawing/2010/main" val="0"/>
@@ -3902,8 +3497,162 @@
         </p:blipFill>
         <p:spPr bwMode="auto">
           <a:xfrm>
-            <a:off x="5303519" y="3043361"/>
-            <a:ext cx="2941575" cy="2206183"/>
+            <a:off x="5336770" y="1772485"/>
+            <a:ext cx="4389121" cy="3291843"/>
+          </a:xfrm>
+          <a:prstGeom prst="rect">
+            <a:avLst/>
+          </a:prstGeom>
+          <a:noFill/>
+          <a:extLst>
+            <a:ext uri="{909E8E84-426E-40DD-AFC4-6F175D3DCCD1}">
+              <a14:hiddenFill xmlns:a14="http://schemas.microsoft.com/office/drawing/2010/main">
+                <a:solidFill>
+                  <a:srgbClr val="FFFFFF"/>
+                </a:solidFill>
+              </a14:hiddenFill>
+            </a:ext>
+          </a:extLst>
+        </p:spPr>
+      </p:pic>
+      <p:pic>
+        <p:nvPicPr>
+          <p:cNvPr id="7" name="Picture 6"/>
+          <p:cNvPicPr>
+            <a:picLocks noChangeAspect="1"/>
+          </p:cNvPicPr>
+          <p:nvPr/>
+        </p:nvPicPr>
+        <p:blipFill>
+          <a:blip r:embed="rId4"/>
+          <a:stretch>
+            <a:fillRect/>
+          </a:stretch>
+        </p:blipFill>
+        <p:spPr>
+          <a:xfrm rot="10800000">
+            <a:off x="3241638" y="5195988"/>
+            <a:ext cx="5551970" cy="1667786"/>
+          </a:xfrm>
+          <a:prstGeom prst="rect">
+            <a:avLst/>
+          </a:prstGeom>
+        </p:spPr>
+      </p:pic>
+    </p:spTree>
+    <p:extLst>
+      <p:ext uri="{BB962C8B-B14F-4D97-AF65-F5344CB8AC3E}">
+        <p14:creationId xmlns:p14="http://schemas.microsoft.com/office/powerpoint/2010/main" val="4027908627"/>
+      </p:ext>
+    </p:extLst>
+  </p:cSld>
+  <p:clrMapOvr>
+    <a:masterClrMapping/>
+  </p:clrMapOvr>
+  <p:timing>
+    <p:tnLst>
+      <p:par>
+        <p:cTn id="1" dur="indefinite" restart="never" nodeType="tmRoot"/>
+      </p:par>
+    </p:tnLst>
+  </p:timing>
+</p:sld>
+</file>
+
+<file path=ppt/slides/slide4.xml><?xml version="1.0" encoding="utf-8"?>
+<p:sld xmlns:a="http://schemas.openxmlformats.org/drawingml/2006/main" xmlns:r="http://schemas.openxmlformats.org/officeDocument/2006/relationships" xmlns:p="http://schemas.openxmlformats.org/presentationml/2006/main">
+  <p:cSld>
+    <p:spTree>
+      <p:nvGrpSpPr>
+        <p:cNvPr id="1" name=""/>
+        <p:cNvGrpSpPr/>
+        <p:nvPr/>
+      </p:nvGrpSpPr>
+      <p:grpSpPr>
+        <a:xfrm>
+          <a:off x="0" y="0"/>
+          <a:ext cx="0" cy="0"/>
+          <a:chOff x="0" y="0"/>
+          <a:chExt cx="0" cy="0"/>
+        </a:xfrm>
+      </p:grpSpPr>
+      <p:sp>
+        <p:nvSpPr>
+          <p:cNvPr id="3" name="Content Placeholder 2"/>
+          <p:cNvSpPr>
+            <a:spLocks noGrp="1"/>
+          </p:cNvSpPr>
+          <p:nvPr>
+            <p:ph idx="1"/>
+          </p:nvPr>
+        </p:nvSpPr>
+        <p:spPr>
+          <a:xfrm>
+            <a:off x="91736" y="552360"/>
+            <a:ext cx="11753900" cy="4351338"/>
+          </a:xfrm>
+        </p:spPr>
+        <p:txBody>
+          <a:bodyPr/>
+          <a:lstStyle/>
+          <a:p>
+            <a:pPr marL="0" indent="0">
+              <a:buNone/>
+            </a:pPr>
+            <a:r>
+              <a:rPr lang="he-IL" dirty="0" smtClean="0"/>
+              <a:t>ישנם מצבי ביניים, כמו למשל כאשר שתי </a:t>
+            </a:r>
+            <a:r>
+              <a:rPr lang="he-IL" dirty="0"/>
+              <a:t>הדמויות מביטות באותו אובייקט בו </a:t>
+            </a:r>
+            <a:r>
+              <a:rPr lang="he-IL" dirty="0" smtClean="0"/>
+              <a:t>זמנית</a:t>
+            </a:r>
+            <a:endParaRPr lang="he-IL" dirty="0"/>
+          </a:p>
+          <a:p>
+            <a:pPr marL="0" indent="0">
+              <a:buNone/>
+            </a:pPr>
+            <a:r>
+              <a:rPr lang="he-IL" dirty="0"/>
+              <a:t/>
+            </a:r>
+            <a:br>
+              <a:rPr lang="he-IL" dirty="0"/>
+            </a:br>
+            <a:endParaRPr lang="he-IL" dirty="0"/>
+          </a:p>
+        </p:txBody>
+      </p:sp>
+      <p:pic>
+        <p:nvPicPr>
+          <p:cNvPr id="6146" name="Picture 2" descr="https://lh3.googleusercontent.com/t7Z5FV4mtgrGb80MM2CGdc57Iz6QWB1zSoZii00TqiDVugnaLpLJc2wQ_MhsQh_LlLJrOdoRIY_H0Xs4snAgBIATvmNT50ipkpStZvIX1VvvwVhmXljTpLRvFAh-_jOkt3okXZtg"/>
+          <p:cNvPicPr>
+            <a:picLocks noChangeAspect="1" noChangeArrowheads="1"/>
+          </p:cNvPicPr>
+          <p:nvPr/>
+        </p:nvPicPr>
+        <p:blipFill>
+          <a:blip r:embed="rId2">
+            <a:extLst>
+              <a:ext uri="{28A0092B-C50C-407E-A947-70E740481C1C}">
+                <a14:useLocalDpi xmlns:a14="http://schemas.microsoft.com/office/drawing/2010/main" val="0"/>
+              </a:ext>
+            </a:extLst>
+          </a:blip>
+          <a:srcRect/>
+          <a:stretch>
+            <a:fillRect/>
+          </a:stretch>
+        </p:blipFill>
+        <p:spPr bwMode="auto">
+          <a:xfrm>
+            <a:off x="3489485" y="2392567"/>
+            <a:ext cx="4801352" cy="3192777"/>
           </a:xfrm>
           <a:prstGeom prst="rect">
             <a:avLst/>
@@ -3923,13 +3672,190 @@
     </p:spTree>
     <p:extLst>
       <p:ext uri="{BB962C8B-B14F-4D97-AF65-F5344CB8AC3E}">
-        <p14:creationId xmlns:p14="http://schemas.microsoft.com/office/powerpoint/2010/main" val="4027908627"/>
+        <p14:creationId xmlns:p14="http://schemas.microsoft.com/office/powerpoint/2010/main" val="3150151110"/>
       </p:ext>
     </p:extLst>
   </p:cSld>
   <p:clrMapOvr>
     <a:masterClrMapping/>
   </p:clrMapOvr>
+  <p:timing>
+    <p:tnLst>
+      <p:par>
+        <p:cTn id="1" dur="indefinite" restart="never" nodeType="tmRoot"/>
+      </p:par>
+    </p:tnLst>
+  </p:timing>
+</p:sld>
+</file>
+
+<file path=ppt/slides/slide5.xml><?xml version="1.0" encoding="utf-8"?>
+<p:sld xmlns:a="http://schemas.openxmlformats.org/drawingml/2006/main" xmlns:r="http://schemas.openxmlformats.org/officeDocument/2006/relationships" xmlns:p="http://schemas.openxmlformats.org/presentationml/2006/main">
+  <p:cSld>
+    <p:spTree>
+      <p:nvGrpSpPr>
+        <p:cNvPr id="1" name=""/>
+        <p:cNvGrpSpPr/>
+        <p:nvPr/>
+      </p:nvGrpSpPr>
+      <p:grpSpPr>
+        <a:xfrm>
+          <a:off x="0" y="0"/>
+          <a:ext cx="0" cy="0"/>
+          <a:chOff x="0" y="0"/>
+          <a:chExt cx="0" cy="0"/>
+        </a:xfrm>
+      </p:grpSpPr>
+      <p:sp>
+        <p:nvSpPr>
+          <p:cNvPr id="3" name="Content Placeholder 2"/>
+          <p:cNvSpPr>
+            <a:spLocks noGrp="1"/>
+          </p:cNvSpPr>
+          <p:nvPr>
+            <p:ph idx="1"/>
+          </p:nvPr>
+        </p:nvSpPr>
+        <p:spPr>
+          <a:xfrm>
+            <a:off x="709031" y="532015"/>
+            <a:ext cx="10558757" cy="5011766"/>
+          </a:xfrm>
+        </p:spPr>
+        <p:txBody>
+          <a:bodyPr/>
+          <a:lstStyle/>
+          <a:p>
+            <a:pPr marL="0" indent="0" algn="ctr">
+              <a:buNone/>
+            </a:pPr>
+            <a:r>
+              <a:rPr lang="he-IL" dirty="0"/>
+              <a:t>או כאשר דמות א' מביטה בדמות ב' ודמות ב' מסיטה את מבטה ונמנעת </a:t>
+            </a:r>
+            <a:r>
+              <a:rPr lang="he-IL" dirty="0" smtClean="0"/>
+              <a:t>מיצירת </a:t>
+            </a:r>
+            <a:r>
+              <a:rPr lang="he-IL" dirty="0"/>
+              <a:t>קשר עין</a:t>
+            </a:r>
+          </a:p>
+          <a:p>
+            <a:pPr marL="0" indent="0">
+              <a:buNone/>
+            </a:pPr>
+            <a:r>
+              <a:rPr lang="he-IL" dirty="0"/>
+              <a:t/>
+            </a:r>
+            <a:br>
+              <a:rPr lang="he-IL" dirty="0"/>
+            </a:br>
+            <a:endParaRPr lang="he-IL" dirty="0"/>
+          </a:p>
+        </p:txBody>
+      </p:sp>
+      <p:pic>
+        <p:nvPicPr>
+          <p:cNvPr id="4" name="Picture 2" descr="https://lh6.googleusercontent.com/qMBKLuBCkNnP77G2K59inZ-HyH-FakPfYNqSF9x_XbT6xN2-8qBIlnpRYGA8v2-QHneIDKLfi0fvT248nxrbC_hXi2a53ui_Pdh73t0WaMoiofZGPSF7aTI9jhP18E1q4owPvNt3"/>
+          <p:cNvPicPr>
+            <a:picLocks noChangeAspect="1" noChangeArrowheads="1"/>
+          </p:cNvPicPr>
+          <p:nvPr/>
+        </p:nvPicPr>
+        <p:blipFill>
+          <a:blip r:embed="rId2">
+            <a:extLst>
+              <a:ext uri="{28A0092B-C50C-407E-A947-70E740481C1C}">
+                <a14:useLocalDpi xmlns:a14="http://schemas.microsoft.com/office/drawing/2010/main" val="0"/>
+              </a:ext>
+            </a:extLst>
+          </a:blip>
+          <a:srcRect/>
+          <a:stretch>
+            <a:fillRect/>
+          </a:stretch>
+        </p:blipFill>
+        <p:spPr bwMode="auto">
+          <a:xfrm>
+            <a:off x="799050" y="2392567"/>
+            <a:ext cx="5064669" cy="2886015"/>
+          </a:xfrm>
+          <a:prstGeom prst="rect">
+            <a:avLst/>
+          </a:prstGeom>
+          <a:noFill/>
+          <a:extLst>
+            <a:ext uri="{909E8E84-426E-40DD-AFC4-6F175D3DCCD1}">
+              <a14:hiddenFill xmlns:a14="http://schemas.microsoft.com/office/drawing/2010/main">
+                <a:solidFill>
+                  <a:srgbClr val="FFFFFF"/>
+                </a:solidFill>
+              </a14:hiddenFill>
+            </a:ext>
+          </a:extLst>
+        </p:spPr>
+      </p:pic>
+      <p:pic>
+        <p:nvPicPr>
+          <p:cNvPr id="5" name="Picture 4" descr="https://lh3.googleusercontent.com/Dt44oYW67i7wkF0nsFLlUk4Lti7Ia8cpjq54sFZY0c5_pNWOCPcV4M0K5SSlfzp21Uy4Q5nWR_AzbR8mkCaBmHwyNW5Nzir7MFRnM0TcrJNgSwVs1hpLR-ji3riG2c3el-8UA-dT"/>
+          <p:cNvPicPr>
+            <a:picLocks noChangeAspect="1" noChangeArrowheads="1"/>
+          </p:cNvPicPr>
+          <p:nvPr/>
+        </p:nvPicPr>
+        <p:blipFill>
+          <a:blip r:embed="rId3">
+            <a:extLst>
+              <a:ext uri="{28A0092B-C50C-407E-A947-70E740481C1C}">
+                <a14:useLocalDpi xmlns:a14="http://schemas.microsoft.com/office/drawing/2010/main" val="0"/>
+              </a:ext>
+            </a:extLst>
+          </a:blip>
+          <a:srcRect/>
+          <a:stretch>
+            <a:fillRect/>
+          </a:stretch>
+        </p:blipFill>
+        <p:spPr bwMode="auto">
+          <a:xfrm>
+            <a:off x="6520296" y="2392567"/>
+            <a:ext cx="4837511" cy="2886015"/>
+          </a:xfrm>
+          <a:prstGeom prst="rect">
+            <a:avLst/>
+          </a:prstGeom>
+          <a:noFill/>
+          <a:extLst>
+            <a:ext uri="{909E8E84-426E-40DD-AFC4-6F175D3DCCD1}">
+              <a14:hiddenFill xmlns:a14="http://schemas.microsoft.com/office/drawing/2010/main">
+                <a:solidFill>
+                  <a:srgbClr val="FFFFFF"/>
+                </a:solidFill>
+              </a14:hiddenFill>
+            </a:ext>
+          </a:extLst>
+        </p:spPr>
+      </p:pic>
+    </p:spTree>
+    <p:extLst>
+      <p:ext uri="{BB962C8B-B14F-4D97-AF65-F5344CB8AC3E}">
+        <p14:creationId xmlns:p14="http://schemas.microsoft.com/office/powerpoint/2010/main" val="1580543854"/>
+      </p:ext>
+    </p:extLst>
+  </p:cSld>
+  <p:clrMapOvr>
+    <a:masterClrMapping/>
+  </p:clrMapOvr>
+  <p:timing>
+    <p:tnLst>
+      <p:par>
+        <p:cTn id="1" dur="indefinite" restart="never" nodeType="tmRoot"/>
+      </p:par>
+    </p:tnLst>
+  </p:timing>
 </p:sld>
 </file>
 
@@ -3962,64 +3888,15 @@
         </p:nvSpPr>
         <p:spPr>
           <a:xfrm>
-            <a:off x="742406" y="1118035"/>
+            <a:off x="808908" y="536144"/>
             <a:ext cx="10515600" cy="4486275"/>
           </a:xfrm>
         </p:spPr>
         <p:txBody>
           <a:bodyPr>
-            <a:normAutofit fontScale="92500" lnSpcReduction="20000"/>
+            <a:normAutofit/>
           </a:bodyPr>
           <a:lstStyle/>
-          <a:p>
-            <a:pPr marL="0" indent="0">
-              <a:buNone/>
-            </a:pPr>
-            <a:r>
-              <a:rPr lang="he-IL" dirty="0" smtClean="0"/>
-              <a:t>הצגנו לכם דוגמאות של ארבע רמות של סינכרון מבט. </a:t>
-            </a:r>
-          </a:p>
-          <a:p>
-            <a:r>
-              <a:rPr lang="he-IL" b="1" dirty="0" smtClean="0">
-                <a:solidFill>
-                  <a:srgbClr val="92D050"/>
-                </a:solidFill>
-              </a:rPr>
-              <a:t>גבוהה</a:t>
-            </a:r>
-          </a:p>
-          <a:p>
-            <a:r>
-              <a:rPr lang="he-IL" b="1" dirty="0" smtClean="0">
-                <a:solidFill>
-                  <a:srgbClr val="FFFF00"/>
-                </a:solidFill>
-              </a:rPr>
-              <a:t>בינונית </a:t>
-            </a:r>
-          </a:p>
-          <a:p>
-            <a:r>
-              <a:rPr lang="he-IL" b="1" dirty="0" smtClean="0">
-                <a:solidFill>
-                  <a:srgbClr val="FFC000"/>
-                </a:solidFill>
-              </a:rPr>
-              <a:t>נמוכה</a:t>
-            </a:r>
-          </a:p>
-          <a:p>
-            <a:r>
-              <a:rPr lang="he-IL" b="1" dirty="0" smtClean="0">
-                <a:solidFill>
-                  <a:srgbClr val="FF0000"/>
-                </a:solidFill>
-              </a:rPr>
-              <a:t>אין סנכרון כלל</a:t>
-            </a:r>
-          </a:p>
           <a:p>
             <a:pPr marL="0" indent="0">
               <a:buNone/>
@@ -4032,11 +3909,7 @@
             </a:pPr>
             <a:r>
               <a:rPr lang="he-IL" dirty="0" smtClean="0"/>
-              <a:t>אולם בתוך כל רמה ישנן ווריאציות. ולכן אנו נותנים לכם לדרג עם הסליידר באופן חופשי – סביב הרמה של סינכרון המבט אותה אתם מאבחנים בכל רגע נתון</a:t>
-            </a:r>
-            <a:r>
-              <a:rPr lang="he-IL" dirty="0" smtClean="0"/>
-              <a:t>.</a:t>
+              <a:t>נבקש מכם לדרג עם הסליידר באופן חופשי את הרמה של סינכרון המבט בין הדמויות בסרט כפי שאתם מבינים וחווים בכל רגע נתון.</a:t>
             </a:r>
           </a:p>
           <a:p>
@@ -4050,109 +3923,13 @@
               <a:buNone/>
             </a:pPr>
             <a:r>
-              <a:rPr lang="he-IL" dirty="0" smtClean="0"/>
-              <a:t>במקרה שעל המסך יש יותר משתי דמויות, דרגו את רמת סינכרון המבט הכוללת לדעתכם בסיטואציה המוצגת. במקרים בהם לא מוצגות דמויות על המסך, הזיזו את הסליידר לקצה השמאלי (ללא סינכרון כלל).</a:t>
+              <a:rPr lang="he-IL" dirty="0"/>
+              <a:t>במקרים בהם על המסך יש יותר משתי דמויות או דמות אחת בלבד, דרגו לפי מיטב הבנתכם.</a:t>
             </a:r>
             <a:endParaRPr lang="he-IL" dirty="0"/>
           </a:p>
         </p:txBody>
       </p:sp>
-      <p:pic>
-        <p:nvPicPr>
-          <p:cNvPr id="4" name="Picture 3"/>
-          <p:cNvPicPr>
-            <a:picLocks noChangeAspect="1"/>
-          </p:cNvPicPr>
-          <p:nvPr/>
-        </p:nvPicPr>
-        <p:blipFill>
-          <a:blip r:embed="rId2"/>
-          <a:stretch>
-            <a:fillRect/>
-          </a:stretch>
-        </p:blipFill>
-        <p:spPr>
-          <a:xfrm>
-            <a:off x="6424927" y="1491308"/>
-            <a:ext cx="2222685" cy="667684"/>
-          </a:xfrm>
-          <a:prstGeom prst="rect">
-            <a:avLst/>
-          </a:prstGeom>
-        </p:spPr>
-      </p:pic>
-      <p:pic>
-        <p:nvPicPr>
-          <p:cNvPr id="5" name="Picture 4"/>
-          <p:cNvPicPr>
-            <a:picLocks noChangeAspect="1"/>
-          </p:cNvPicPr>
-          <p:nvPr/>
-        </p:nvPicPr>
-        <p:blipFill>
-          <a:blip r:embed="rId3"/>
-          <a:stretch>
-            <a:fillRect/>
-          </a:stretch>
-        </p:blipFill>
-        <p:spPr>
-          <a:xfrm>
-            <a:off x="6503303" y="2796519"/>
-            <a:ext cx="2170435" cy="497816"/>
-          </a:xfrm>
-          <a:prstGeom prst="rect">
-            <a:avLst/>
-          </a:prstGeom>
-        </p:spPr>
-      </p:pic>
-      <p:pic>
-        <p:nvPicPr>
-          <p:cNvPr id="6" name="Picture 5"/>
-          <p:cNvPicPr>
-            <a:picLocks noChangeAspect="1"/>
-          </p:cNvPicPr>
-          <p:nvPr/>
-        </p:nvPicPr>
-        <p:blipFill>
-          <a:blip r:embed="rId4"/>
-          <a:stretch>
-            <a:fillRect/>
-          </a:stretch>
-        </p:blipFill>
-        <p:spPr>
-          <a:xfrm rot="10800000">
-            <a:off x="6424927" y="1945599"/>
-            <a:ext cx="2118181" cy="519709"/>
-          </a:xfrm>
-          <a:prstGeom prst="rect">
-            <a:avLst/>
-          </a:prstGeom>
-        </p:spPr>
-      </p:pic>
-      <p:pic>
-        <p:nvPicPr>
-          <p:cNvPr id="7" name="Picture 6"/>
-          <p:cNvPicPr>
-            <a:picLocks noChangeAspect="1"/>
-          </p:cNvPicPr>
-          <p:nvPr/>
-        </p:nvPicPr>
-        <p:blipFill>
-          <a:blip r:embed="rId4"/>
-          <a:stretch>
-            <a:fillRect/>
-          </a:stretch>
-        </p:blipFill>
-        <p:spPr>
-          <a:xfrm>
-            <a:off x="6529430" y="2268010"/>
-            <a:ext cx="2118182" cy="528509"/>
-          </a:xfrm>
-          <a:prstGeom prst="rect">
-            <a:avLst/>
-          </a:prstGeom>
-        </p:spPr>
-      </p:pic>
     </p:spTree>
     <p:extLst>
       <p:ext uri="{BB962C8B-B14F-4D97-AF65-F5344CB8AC3E}">
@@ -4163,6 +3940,13 @@
   <p:clrMapOvr>
     <a:masterClrMapping/>
   </p:clrMapOvr>
+  <p:timing>
+    <p:tnLst>
+      <p:par>
+        <p:cTn id="1" dur="indefinite" restart="never" nodeType="tmRoot"/>
+      </p:par>
+    </p:tnLst>
+  </p:timing>
 </p:sld>
 </file>
 

</xml_diff>